<commit_message>
Upload Edits to the Documents, Final Submission
</commit_message>
<xml_diff>
--- a/TP03/TP04 Pfeiffer, Rodriguez-Jenkins, Saxen.pptx
+++ b/TP03/TP04 Pfeiffer, Rodriguez-Jenkins, Saxen.pptx
@@ -5,7 +5,7 @@
     <p:sldMasterId id="2147483657" r:id="rId4"/>
   </p:sldMasterIdLst>
   <p:notesMasterIdLst>
-    <p:notesMasterId r:id="rId20"/>
+    <p:notesMasterId r:id="rId23"/>
   </p:notesMasterIdLst>
   <p:sldIdLst>
     <p:sldId id="256" r:id="rId5"/>
@@ -16,13 +16,16 @@
     <p:sldId id="279" r:id="rId10"/>
     <p:sldId id="280" r:id="rId11"/>
     <p:sldId id="281" r:id="rId12"/>
-    <p:sldId id="282" r:id="rId13"/>
-    <p:sldId id="287" r:id="rId14"/>
-    <p:sldId id="283" r:id="rId15"/>
-    <p:sldId id="284" r:id="rId16"/>
-    <p:sldId id="285" r:id="rId17"/>
-    <p:sldId id="286" r:id="rId18"/>
-    <p:sldId id="276" r:id="rId19"/>
+    <p:sldId id="288" r:id="rId13"/>
+    <p:sldId id="282" r:id="rId14"/>
+    <p:sldId id="287" r:id="rId15"/>
+    <p:sldId id="283" r:id="rId16"/>
+    <p:sldId id="289" r:id="rId17"/>
+    <p:sldId id="290" r:id="rId18"/>
+    <p:sldId id="284" r:id="rId19"/>
+    <p:sldId id="285" r:id="rId20"/>
+    <p:sldId id="286" r:id="rId21"/>
+    <p:sldId id="276" r:id="rId22"/>
   </p:sldIdLst>
   <p:sldSz cx="9144000" cy="5143500" type="screen16x9"/>
   <p:notesSz cx="6858000" cy="9144000"/>
@@ -266,6 +269,8 @@
 <file path=ppt/revisionInfo.xml><?xml version="1.0" encoding="utf-8"?>
 <p1510:revInfo xmlns:a="http://schemas.openxmlformats.org/drawingml/2006/main" xmlns:r="http://schemas.openxmlformats.org/officeDocument/2006/relationships" xmlns:p1510="http://schemas.microsoft.com/office/powerpoint/2015/10/main">
   <p1510:revLst>
+    <p1510:client id="{6B5370C1-4706-46E5-BAD4-20D0C746A5CC}" v="329" dt="2023-06-11T03:46:07.607"/>
+    <p1510:client id="{B889BC0F-7C6B-479C-915F-29EF7B4ECFED}" v="235" dt="2023-06-11T03:06:14.198"/>
     <p1510:client id="{F5A4D150-B4CE-43D1-AE77-FC206F6238D4}" v="1" dt="2023-06-10T23:34:56.491"/>
   </p1510:revLst>
 </p1510:revInfo>
@@ -273,6 +278,169 @@
 
 <file path=ppt/changesInfos/changesInfo1.xml><?xml version="1.0" encoding="utf-8"?>
 <pc:chgInfo xmlns:a="http://schemas.openxmlformats.org/drawingml/2006/main" xmlns:r="http://schemas.openxmlformats.org/officeDocument/2006/relationships" xmlns:ac="http://schemas.microsoft.com/office/drawing/2013/main/command" xmlns:pc="http://schemas.microsoft.com/office/powerpoint/2013/main/command">
+  <pc:docChgLst>
+    <pc:chgData name="Ean Pfeiffer" userId="S::pfeifferean@cityuniversity.edu::8f40fd6a-517f-451f-82b9-457e5cd4952d" providerId="AD" clId="Web-{6B5370C1-4706-46E5-BAD4-20D0C746A5CC}"/>
+    <pc:docChg chg="addSld delSld modSld">
+      <pc:chgData name="Ean Pfeiffer" userId="S::pfeifferean@cityuniversity.edu::8f40fd6a-517f-451f-82b9-457e5cd4952d" providerId="AD" clId="Web-{6B5370C1-4706-46E5-BAD4-20D0C746A5CC}" dt="2023-06-11T03:46:07.607" v="319" actId="1076"/>
+      <pc:docMkLst>
+        <pc:docMk/>
+      </pc:docMkLst>
+      <pc:sldChg chg="modSp">
+        <pc:chgData name="Ean Pfeiffer" userId="S::pfeifferean@cityuniversity.edu::8f40fd6a-517f-451f-82b9-457e5cd4952d" providerId="AD" clId="Web-{6B5370C1-4706-46E5-BAD4-20D0C746A5CC}" dt="2023-06-11T03:35:08.573" v="99" actId="1076"/>
+        <pc:sldMkLst>
+          <pc:docMk/>
+          <pc:sldMk cId="1003738918" sldId="283"/>
+        </pc:sldMkLst>
+        <pc:spChg chg="mod">
+          <ac:chgData name="Ean Pfeiffer" userId="S::pfeifferean@cityuniversity.edu::8f40fd6a-517f-451f-82b9-457e5cd4952d" providerId="AD" clId="Web-{6B5370C1-4706-46E5-BAD4-20D0C746A5CC}" dt="2023-06-11T03:35:05.245" v="98" actId="1076"/>
+          <ac:spMkLst>
+            <pc:docMk/>
+            <pc:sldMk cId="1003738918" sldId="283"/>
+            <ac:spMk id="3" creationId="{9C4213B6-1909-EE55-ECFF-84F86417F81D}"/>
+          </ac:spMkLst>
+        </pc:spChg>
+        <pc:picChg chg="mod">
+          <ac:chgData name="Ean Pfeiffer" userId="S::pfeifferean@cityuniversity.edu::8f40fd6a-517f-451f-82b9-457e5cd4952d" providerId="AD" clId="Web-{6B5370C1-4706-46E5-BAD4-20D0C746A5CC}" dt="2023-06-11T03:35:08.573" v="99" actId="1076"/>
+          <ac:picMkLst>
+            <pc:docMk/>
+            <pc:sldMk cId="1003738918" sldId="283"/>
+            <ac:picMk id="6" creationId="{A4ABCCC3-435E-012A-844C-FB0FE267267B}"/>
+          </ac:picMkLst>
+        </pc:picChg>
+      </pc:sldChg>
+      <pc:sldChg chg="modSp">
+        <pc:chgData name="Ean Pfeiffer" userId="S::pfeifferean@cityuniversity.edu::8f40fd6a-517f-451f-82b9-457e5cd4952d" providerId="AD" clId="Web-{6B5370C1-4706-46E5-BAD4-20D0C746A5CC}" dt="2023-06-11T03:46:07.607" v="319" actId="1076"/>
+        <pc:sldMkLst>
+          <pc:docMk/>
+          <pc:sldMk cId="884280853" sldId="286"/>
+        </pc:sldMkLst>
+        <pc:spChg chg="mod">
+          <ac:chgData name="Ean Pfeiffer" userId="S::pfeifferean@cityuniversity.edu::8f40fd6a-517f-451f-82b9-457e5cd4952d" providerId="AD" clId="Web-{6B5370C1-4706-46E5-BAD4-20D0C746A5CC}" dt="2023-06-11T03:46:07.607" v="319" actId="1076"/>
+          <ac:spMkLst>
+            <pc:docMk/>
+            <pc:sldMk cId="884280853" sldId="286"/>
+            <ac:spMk id="3" creationId="{230C22AC-9CFA-DB61-4378-2260BC9BBC90}"/>
+          </ac:spMkLst>
+        </pc:spChg>
+      </pc:sldChg>
+      <pc:sldChg chg="modSp">
+        <pc:chgData name="Ean Pfeiffer" userId="S::pfeifferean@cityuniversity.edu::8f40fd6a-517f-451f-82b9-457e5cd4952d" providerId="AD" clId="Web-{6B5370C1-4706-46E5-BAD4-20D0C746A5CC}" dt="2023-06-11T03:34:38.432" v="94" actId="1076"/>
+        <pc:sldMkLst>
+          <pc:docMk/>
+          <pc:sldMk cId="3407748887" sldId="288"/>
+        </pc:sldMkLst>
+        <pc:spChg chg="mod">
+          <ac:chgData name="Ean Pfeiffer" userId="S::pfeifferean@cityuniversity.edu::8f40fd6a-517f-451f-82b9-457e5cd4952d" providerId="AD" clId="Web-{6B5370C1-4706-46E5-BAD4-20D0C746A5CC}" dt="2023-06-11T03:34:38.432" v="94" actId="1076"/>
+          <ac:spMkLst>
+            <pc:docMk/>
+            <pc:sldMk cId="3407748887" sldId="288"/>
+            <ac:spMk id="3" creationId="{79127BB7-E5EE-0ABE-1833-E762C8C34E82}"/>
+          </ac:spMkLst>
+        </pc:spChg>
+      </pc:sldChg>
+      <pc:sldChg chg="addSp delSp modSp add replId">
+        <pc:chgData name="Ean Pfeiffer" userId="S::pfeifferean@cityuniversity.edu::8f40fd6a-517f-451f-82b9-457e5cd4952d" providerId="AD" clId="Web-{6B5370C1-4706-46E5-BAD4-20D0C746A5CC}" dt="2023-06-11T03:39:05.890" v="218" actId="20577"/>
+        <pc:sldMkLst>
+          <pc:docMk/>
+          <pc:sldMk cId="3837208746" sldId="289"/>
+        </pc:sldMkLst>
+        <pc:spChg chg="mod">
+          <ac:chgData name="Ean Pfeiffer" userId="S::pfeifferean@cityuniversity.edu::8f40fd6a-517f-451f-82b9-457e5cd4952d" providerId="AD" clId="Web-{6B5370C1-4706-46E5-BAD4-20D0C746A5CC}" dt="2023-06-11T03:36:34.809" v="117" actId="20577"/>
+          <ac:spMkLst>
+            <pc:docMk/>
+            <pc:sldMk cId="3837208746" sldId="289"/>
+            <ac:spMk id="2" creationId="{D7B3DE4C-01F4-A562-2D38-1FFD8D542404}"/>
+          </ac:spMkLst>
+        </pc:spChg>
+        <pc:spChg chg="mod">
+          <ac:chgData name="Ean Pfeiffer" userId="S::pfeifferean@cityuniversity.edu::8f40fd6a-517f-451f-82b9-457e5cd4952d" providerId="AD" clId="Web-{6B5370C1-4706-46E5-BAD4-20D0C746A5CC}" dt="2023-06-11T03:39:05.890" v="218" actId="20577"/>
+          <ac:spMkLst>
+            <pc:docMk/>
+            <pc:sldMk cId="3837208746" sldId="289"/>
+            <ac:spMk id="3" creationId="{9C4213B6-1909-EE55-ECFF-84F86417F81D}"/>
+          </ac:spMkLst>
+        </pc:spChg>
+        <pc:picChg chg="add del mod">
+          <ac:chgData name="Ean Pfeiffer" userId="S::pfeifferean@cityuniversity.edu::8f40fd6a-517f-451f-82b9-457e5cd4952d" providerId="AD" clId="Web-{6B5370C1-4706-46E5-BAD4-20D0C746A5CC}" dt="2023-06-11T03:35:53.121" v="109"/>
+          <ac:picMkLst>
+            <pc:docMk/>
+            <pc:sldMk cId="3837208746" sldId="289"/>
+            <ac:picMk id="5" creationId="{178E9D85-F567-22B3-6BEE-D771C9A30607}"/>
+          </ac:picMkLst>
+        </pc:picChg>
+        <pc:picChg chg="del">
+          <ac:chgData name="Ean Pfeiffer" userId="S::pfeifferean@cityuniversity.edu::8f40fd6a-517f-451f-82b9-457e5cd4952d" providerId="AD" clId="Web-{6B5370C1-4706-46E5-BAD4-20D0C746A5CC}" dt="2023-06-11T03:35:39.402" v="101"/>
+          <ac:picMkLst>
+            <pc:docMk/>
+            <pc:sldMk cId="3837208746" sldId="289"/>
+            <ac:picMk id="6" creationId="{A4ABCCC3-435E-012A-844C-FB0FE267267B}"/>
+          </ac:picMkLst>
+        </pc:picChg>
+        <pc:picChg chg="add mod">
+          <ac:chgData name="Ean Pfeiffer" userId="S::pfeifferean@cityuniversity.edu::8f40fd6a-517f-451f-82b9-457e5cd4952d" providerId="AD" clId="Web-{6B5370C1-4706-46E5-BAD4-20D0C746A5CC}" dt="2023-06-11T03:36:22.965" v="113" actId="1076"/>
+          <ac:picMkLst>
+            <pc:docMk/>
+            <pc:sldMk cId="3837208746" sldId="289"/>
+            <ac:picMk id="7" creationId="{CCD627AC-9D8B-6EB3-38A3-13A014FB36CD}"/>
+          </ac:picMkLst>
+        </pc:picChg>
+      </pc:sldChg>
+      <pc:sldChg chg="addSp delSp modSp add replId">
+        <pc:chgData name="Ean Pfeiffer" userId="S::pfeifferean@cityuniversity.edu::8f40fd6a-517f-451f-82b9-457e5cd4952d" providerId="AD" clId="Web-{6B5370C1-4706-46E5-BAD4-20D0C746A5CC}" dt="2023-06-11T03:45:31.918" v="316" actId="1076"/>
+        <pc:sldMkLst>
+          <pc:docMk/>
+          <pc:sldMk cId="3133829735" sldId="290"/>
+        </pc:sldMkLst>
+        <pc:spChg chg="mod">
+          <ac:chgData name="Ean Pfeiffer" userId="S::pfeifferean@cityuniversity.edu::8f40fd6a-517f-451f-82b9-457e5cd4952d" providerId="AD" clId="Web-{6B5370C1-4706-46E5-BAD4-20D0C746A5CC}" dt="2023-06-11T03:45:19.902" v="310" actId="20577"/>
+          <ac:spMkLst>
+            <pc:docMk/>
+            <pc:sldMk cId="3133829735" sldId="290"/>
+            <ac:spMk id="3" creationId="{9C4213B6-1909-EE55-ECFF-84F86417F81D}"/>
+          </ac:spMkLst>
+        </pc:spChg>
+        <pc:picChg chg="add del mod">
+          <ac:chgData name="Ean Pfeiffer" userId="S::pfeifferean@cityuniversity.edu::8f40fd6a-517f-451f-82b9-457e5cd4952d" providerId="AD" clId="Web-{6B5370C1-4706-46E5-BAD4-20D0C746A5CC}" dt="2023-06-11T03:43:10.962" v="256"/>
+          <ac:picMkLst>
+            <pc:docMk/>
+            <pc:sldMk cId="3133829735" sldId="290"/>
+            <ac:picMk id="5" creationId="{75ADBDE9-73DE-805D-4FA0-053F6DF241F3}"/>
+          </ac:picMkLst>
+        </pc:picChg>
+        <pc:picChg chg="add mod">
+          <ac:chgData name="Ean Pfeiffer" userId="S::pfeifferean@cityuniversity.edu::8f40fd6a-517f-451f-82b9-457e5cd4952d" providerId="AD" clId="Web-{6B5370C1-4706-46E5-BAD4-20D0C746A5CC}" dt="2023-06-11T03:43:16.790" v="258" actId="1076"/>
+          <ac:picMkLst>
+            <pc:docMk/>
+            <pc:sldMk cId="3133829735" sldId="290"/>
+            <ac:picMk id="6" creationId="{69812E76-28B9-467B-5E16-F4744A0A5766}"/>
+          </ac:picMkLst>
+        </pc:picChg>
+        <pc:picChg chg="del">
+          <ac:chgData name="Ean Pfeiffer" userId="S::pfeifferean@cityuniversity.edu::8f40fd6a-517f-451f-82b9-457e5cd4952d" providerId="AD" clId="Web-{6B5370C1-4706-46E5-BAD4-20D0C746A5CC}" dt="2023-06-11T03:41:58.086" v="225"/>
+          <ac:picMkLst>
+            <pc:docMk/>
+            <pc:sldMk cId="3133829735" sldId="290"/>
+            <ac:picMk id="7" creationId="{CCD627AC-9D8B-6EB3-38A3-13A014FB36CD}"/>
+          </ac:picMkLst>
+        </pc:picChg>
+        <pc:picChg chg="add mod">
+          <ac:chgData name="Ean Pfeiffer" userId="S::pfeifferean@cityuniversity.edu::8f40fd6a-517f-451f-82b9-457e5cd4952d" providerId="AD" clId="Web-{6B5370C1-4706-46E5-BAD4-20D0C746A5CC}" dt="2023-06-11T03:45:31.918" v="316" actId="1076"/>
+          <ac:picMkLst>
+            <pc:docMk/>
+            <pc:sldMk cId="3133829735" sldId="290"/>
+            <ac:picMk id="8" creationId="{19D14947-4C52-FA65-AAE6-7296C3FCDC67}"/>
+          </ac:picMkLst>
+        </pc:picChg>
+      </pc:sldChg>
+      <pc:sldChg chg="add del replId">
+        <pc:chgData name="Ean Pfeiffer" userId="S::pfeifferean@cityuniversity.edu::8f40fd6a-517f-451f-82b9-457e5cd4952d" providerId="AD" clId="Web-{6B5370C1-4706-46E5-BAD4-20D0C746A5CC}" dt="2023-06-11T03:45:22.324" v="312"/>
+        <pc:sldMkLst>
+          <pc:docMk/>
+          <pc:sldMk cId="3630614096" sldId="291"/>
+        </pc:sldMkLst>
+      </pc:sldChg>
+    </pc:docChg>
+  </pc:docChgLst>
   <pc:docChgLst>
     <pc:chgData name="Brock Saxen" userId="c29ee266-9729-4710-8c94-d719cafc9bb8" providerId="ADAL" clId="{F5A4D150-B4CE-43D1-AE77-FC206F6238D4}"/>
     <pc:docChg chg="addSld modSld">
@@ -310,6 +478,106 @@
             <ac:picMk id="5" creationId="{93D4D1EF-B5EC-658F-F949-09C1C705E6CA}"/>
           </ac:picMkLst>
         </pc:picChg>
+      </pc:sldChg>
+    </pc:docChg>
+  </pc:docChgLst>
+  <pc:docChgLst>
+    <pc:chgData name="Ean Pfeiffer" userId="S::pfeifferean@cityuniversity.edu::8f40fd6a-517f-451f-82b9-457e5cd4952d" providerId="AD" clId="Web-{B889BC0F-7C6B-479C-915F-29EF7B4ECFED}"/>
+    <pc:docChg chg="addSld modSld">
+      <pc:chgData name="Ean Pfeiffer" userId="S::pfeifferean@cityuniversity.edu::8f40fd6a-517f-451f-82b9-457e5cd4952d" providerId="AD" clId="Web-{B889BC0F-7C6B-479C-915F-29EF7B4ECFED}" dt="2023-06-11T03:06:14.198" v="224" actId="20577"/>
+      <pc:docMkLst>
+        <pc:docMk/>
+      </pc:docMkLst>
+      <pc:sldChg chg="modSp">
+        <pc:chgData name="Ean Pfeiffer" userId="S::pfeifferean@cityuniversity.edu::8f40fd6a-517f-451f-82b9-457e5cd4952d" providerId="AD" clId="Web-{B889BC0F-7C6B-479C-915F-29EF7B4ECFED}" dt="2023-06-11T02:55:30.222" v="37" actId="20577"/>
+        <pc:sldMkLst>
+          <pc:docMk/>
+          <pc:sldMk cId="2425647436" sldId="274"/>
+        </pc:sldMkLst>
+        <pc:spChg chg="mod">
+          <ac:chgData name="Ean Pfeiffer" userId="S::pfeifferean@cityuniversity.edu::8f40fd6a-517f-451f-82b9-457e5cd4952d" providerId="AD" clId="Web-{B889BC0F-7C6B-479C-915F-29EF7B4ECFED}" dt="2023-06-11T02:55:00.315" v="28" actId="20577"/>
+          <ac:spMkLst>
+            <pc:docMk/>
+            <pc:sldMk cId="2425647436" sldId="274"/>
+            <ac:spMk id="3" creationId="{00000000-0000-0000-0000-000000000000}"/>
+          </ac:spMkLst>
+        </pc:spChg>
+        <pc:spChg chg="mod">
+          <ac:chgData name="Ean Pfeiffer" userId="S::pfeifferean@cityuniversity.edu::8f40fd6a-517f-451f-82b9-457e5cd4952d" providerId="AD" clId="Web-{B889BC0F-7C6B-479C-915F-29EF7B4ECFED}" dt="2023-06-11T02:55:30.222" v="37" actId="20577"/>
+          <ac:spMkLst>
+            <pc:docMk/>
+            <pc:sldMk cId="2425647436" sldId="274"/>
+            <ac:spMk id="5" creationId="{00000000-0000-0000-0000-000000000000}"/>
+          </ac:spMkLst>
+        </pc:spChg>
+      </pc:sldChg>
+      <pc:sldChg chg="modSp">
+        <pc:chgData name="Ean Pfeiffer" userId="S::pfeifferean@cityuniversity.edu::8f40fd6a-517f-451f-82b9-457e5cd4952d" providerId="AD" clId="Web-{B889BC0F-7C6B-479C-915F-29EF7B4ECFED}" dt="2023-06-11T02:58:57.761" v="87" actId="20577"/>
+        <pc:sldMkLst>
+          <pc:docMk/>
+          <pc:sldMk cId="3443371739" sldId="275"/>
+        </pc:sldMkLst>
+        <pc:spChg chg="mod">
+          <ac:chgData name="Ean Pfeiffer" userId="S::pfeifferean@cityuniversity.edu::8f40fd6a-517f-451f-82b9-457e5cd4952d" providerId="AD" clId="Web-{B889BC0F-7C6B-479C-915F-29EF7B4ECFED}" dt="2023-06-11T02:58:57.761" v="87" actId="20577"/>
+          <ac:spMkLst>
+            <pc:docMk/>
+            <pc:sldMk cId="3443371739" sldId="275"/>
+            <ac:spMk id="3" creationId="{00000000-0000-0000-0000-000000000000}"/>
+          </ac:spMkLst>
+        </pc:spChg>
+      </pc:sldChg>
+      <pc:sldChg chg="modSp">
+        <pc:chgData name="Ean Pfeiffer" userId="S::pfeifferean@cityuniversity.edu::8f40fd6a-517f-451f-82b9-457e5cd4952d" providerId="AD" clId="Web-{B889BC0F-7C6B-479C-915F-29EF7B4ECFED}" dt="2023-06-11T03:00:39.515" v="130" actId="20577"/>
+        <pc:sldMkLst>
+          <pc:docMk/>
+          <pc:sldMk cId="2038480118" sldId="277"/>
+        </pc:sldMkLst>
+        <pc:spChg chg="mod">
+          <ac:chgData name="Ean Pfeiffer" userId="S::pfeifferean@cityuniversity.edu::8f40fd6a-517f-451f-82b9-457e5cd4952d" providerId="AD" clId="Web-{B889BC0F-7C6B-479C-915F-29EF7B4ECFED}" dt="2023-06-11T03:00:39.515" v="130" actId="20577"/>
+          <ac:spMkLst>
+            <pc:docMk/>
+            <pc:sldMk cId="2038480118" sldId="277"/>
+            <ac:spMk id="3" creationId="{A799EF1F-5C7E-961E-2BED-126FD1B7B9D6}"/>
+          </ac:spMkLst>
+        </pc:spChg>
+      </pc:sldChg>
+      <pc:sldChg chg="modSp">
+        <pc:chgData name="Ean Pfeiffer" userId="S::pfeifferean@cityuniversity.edu::8f40fd6a-517f-451f-82b9-457e5cd4952d" providerId="AD" clId="Web-{B889BC0F-7C6B-479C-915F-29EF7B4ECFED}" dt="2023-06-11T03:05:26.384" v="212" actId="20577"/>
+        <pc:sldMkLst>
+          <pc:docMk/>
+          <pc:sldMk cId="1613214410" sldId="278"/>
+        </pc:sldMkLst>
+        <pc:spChg chg="mod">
+          <ac:chgData name="Ean Pfeiffer" userId="S::pfeifferean@cityuniversity.edu::8f40fd6a-517f-451f-82b9-457e5cd4952d" providerId="AD" clId="Web-{B889BC0F-7C6B-479C-915F-29EF7B4ECFED}" dt="2023-06-11T03:05:26.384" v="212" actId="20577"/>
+          <ac:spMkLst>
+            <pc:docMk/>
+            <pc:sldMk cId="1613214410" sldId="278"/>
+            <ac:spMk id="3" creationId="{99BF8019-8DAF-2C04-59A1-0BECBAA0D63B}"/>
+          </ac:spMkLst>
+        </pc:spChg>
+      </pc:sldChg>
+      <pc:sldChg chg="modSp add replId">
+        <pc:chgData name="Ean Pfeiffer" userId="S::pfeifferean@cityuniversity.edu::8f40fd6a-517f-451f-82b9-457e5cd4952d" providerId="AD" clId="Web-{B889BC0F-7C6B-479C-915F-29EF7B4ECFED}" dt="2023-06-11T03:06:14.198" v="224" actId="20577"/>
+        <pc:sldMkLst>
+          <pc:docMk/>
+          <pc:sldMk cId="3407748887" sldId="288"/>
+        </pc:sldMkLst>
+        <pc:spChg chg="mod">
+          <ac:chgData name="Ean Pfeiffer" userId="S::pfeifferean@cityuniversity.edu::8f40fd6a-517f-451f-82b9-457e5cd4952d" providerId="AD" clId="Web-{B889BC0F-7C6B-479C-915F-29EF7B4ECFED}" dt="2023-06-11T03:06:14.198" v="224" actId="20577"/>
+          <ac:spMkLst>
+            <pc:docMk/>
+            <pc:sldMk cId="3407748887" sldId="288"/>
+            <ac:spMk id="2" creationId="{B5F8679E-1222-6879-05B1-C46135C583DC}"/>
+          </ac:spMkLst>
+        </pc:spChg>
+        <pc:spChg chg="mod">
+          <ac:chgData name="Ean Pfeiffer" userId="S::pfeifferean@cityuniversity.edu::8f40fd6a-517f-451f-82b9-457e5cd4952d" providerId="AD" clId="Web-{B889BC0F-7C6B-479C-915F-29EF7B4ECFED}" dt="2023-06-11T03:05:04.040" v="203" actId="20577"/>
+          <ac:spMkLst>
+            <pc:docMk/>
+            <pc:sldMk cId="3407748887" sldId="288"/>
+            <ac:spMk id="3" creationId="{79127BB7-E5EE-0ABE-1833-E762C8C34E82}"/>
+          </ac:spMkLst>
+        </pc:spChg>
       </pc:sldChg>
     </pc:docChg>
   </pc:docChgLst>
@@ -4420,6 +4688,141 @@
           <p:cNvPr id="2" name="Title 1">
             <a:extLst>
               <a:ext uri="{FF2B5EF4-FFF2-40B4-BE49-F238E27FC236}">
+                <a16:creationId xmlns:a16="http://schemas.microsoft.com/office/drawing/2014/main" id="{F625A524-BD98-C5F0-7C52-E0E657448133}"/>
+              </a:ext>
+            </a:extLst>
+          </p:cNvPr>
+          <p:cNvSpPr>
+            <a:spLocks noGrp="1"/>
+          </p:cNvSpPr>
+          <p:nvPr>
+            <p:ph type="title"/>
+          </p:nvPr>
+        </p:nvSpPr>
+        <p:spPr/>
+        <p:txBody>
+          <a:bodyPr/>
+          <a:lstStyle/>
+          <a:p>
+            <a:r>
+              <a:rPr lang="en-US" dirty="0"/>
+              <a:t>Data Cleaning</a:t>
+            </a:r>
+          </a:p>
+        </p:txBody>
+      </p:sp>
+      <p:sp>
+        <p:nvSpPr>
+          <p:cNvPr id="3" name="Text Placeholder 2">
+            <a:extLst>
+              <a:ext uri="{FF2B5EF4-FFF2-40B4-BE49-F238E27FC236}">
+                <a16:creationId xmlns:a16="http://schemas.microsoft.com/office/drawing/2014/main" id="{4C753171-CC61-AF7D-5CB0-878CA0276177}"/>
+              </a:ext>
+            </a:extLst>
+          </p:cNvPr>
+          <p:cNvSpPr>
+            <a:spLocks noGrp="1"/>
+          </p:cNvSpPr>
+          <p:nvPr>
+            <p:ph type="body" idx="1"/>
+          </p:nvPr>
+        </p:nvSpPr>
+        <p:spPr/>
+        <p:txBody>
+          <a:bodyPr/>
+          <a:lstStyle/>
+          <a:p>
+            <a:pPr marL="76200" indent="0">
+              <a:buNone/>
+            </a:pPr>
+            <a:r>
+              <a:rPr lang="en-US" dirty="0"/>
+              <a:t>We had to do some data cleaning to come up with data that was more directly comparable and to remove values that would skew our visualizations, such as </a:t>
+            </a:r>
+            <a:r>
+              <a:rPr lang="en-US" dirty="0" err="1"/>
+              <a:t>NaN</a:t>
+            </a:r>
+            <a:r>
+              <a:rPr lang="en-US" dirty="0"/>
+              <a:t> and duplicate values. </a:t>
+            </a:r>
+          </a:p>
+        </p:txBody>
+      </p:sp>
+      <p:sp>
+        <p:nvSpPr>
+          <p:cNvPr id="4" name="Slide Number Placeholder 3">
+            <a:extLst>
+              <a:ext uri="{FF2B5EF4-FFF2-40B4-BE49-F238E27FC236}">
+                <a16:creationId xmlns:a16="http://schemas.microsoft.com/office/drawing/2014/main" id="{58147226-5C11-DA09-8F9C-C066F1B12049}"/>
+              </a:ext>
+            </a:extLst>
+          </p:cNvPr>
+          <p:cNvSpPr>
+            <a:spLocks noGrp="1"/>
+          </p:cNvSpPr>
+          <p:nvPr>
+            <p:ph type="sldNum" idx="12"/>
+          </p:nvPr>
+        </p:nvSpPr>
+        <p:spPr/>
+        <p:txBody>
+          <a:bodyPr/>
+          <a:lstStyle/>
+          <a:p>
+            <a:pPr marL="0" lvl="0" indent="0" algn="r" rtl="0">
+              <a:spcBef>
+                <a:spcPts val="0"/>
+              </a:spcBef>
+              <a:spcAft>
+                <a:spcPts val="0"/>
+              </a:spcAft>
+              <a:buNone/>
+            </a:pPr>
+            <a:fld id="{00000000-1234-1234-1234-123412341234}" type="slidenum">
+              <a:rPr lang="en" smtClean="0"/>
+              <a:t>10</a:t>
+            </a:fld>
+            <a:endParaRPr lang="en"/>
+          </a:p>
+        </p:txBody>
+      </p:sp>
+    </p:spTree>
+    <p:extLst>
+      <p:ext uri="{BB962C8B-B14F-4D97-AF65-F5344CB8AC3E}">
+        <p14:creationId xmlns:p14="http://schemas.microsoft.com/office/powerpoint/2010/main" val="342675417"/>
+      </p:ext>
+    </p:extLst>
+  </p:cSld>
+  <p:clrMapOvr>
+    <a:masterClrMapping/>
+  </p:clrMapOvr>
+</p:sld>
+</file>
+
+<file path=ppt/slides/slide11.xml><?xml version="1.0" encoding="utf-8"?>
+<p:sld xmlns:a="http://schemas.openxmlformats.org/drawingml/2006/main" xmlns:r="http://schemas.openxmlformats.org/officeDocument/2006/relationships" xmlns:p="http://schemas.openxmlformats.org/presentationml/2006/main">
+  <p:cSld>
+    <p:spTree>
+      <p:nvGrpSpPr>
+        <p:cNvPr id="1" name=""/>
+        <p:cNvGrpSpPr/>
+        <p:nvPr/>
+      </p:nvGrpSpPr>
+      <p:grpSpPr>
+        <a:xfrm>
+          <a:off x="0" y="0"/>
+          <a:ext cx="0" cy="0"/>
+          <a:chOff x="0" y="0"/>
+          <a:chExt cx="0" cy="0"/>
+        </a:xfrm>
+      </p:grpSpPr>
+      <p:sp>
+        <p:nvSpPr>
+          <p:cNvPr id="2" name="Title 1">
+            <a:extLst>
+              <a:ext uri="{FF2B5EF4-FFF2-40B4-BE49-F238E27FC236}">
                 <a16:creationId xmlns:a16="http://schemas.microsoft.com/office/drawing/2014/main" id="{71FFF319-D9DF-2B4D-6637-ED89468E6016}"/>
               </a:ext>
             </a:extLst>
@@ -4527,7 +4930,7 @@
             </a:pPr>
             <a:fld id="{00000000-1234-1234-1234-123412341234}" type="slidenum">
               <a:rPr lang="en" smtClean="0"/>
-              <a:t>10</a:t>
+              <a:t>11</a:t>
             </a:fld>
             <a:endParaRPr lang="en"/>
           </a:p>
@@ -4582,7 +4985,7 @@
 </p:sld>
 </file>
 
-<file path=ppt/slides/slide11.xml><?xml version="1.0" encoding="utf-8"?>
+<file path=ppt/slides/slide12.xml><?xml version="1.0" encoding="utf-8"?>
 <p:sld xmlns:a="http://schemas.openxmlformats.org/drawingml/2006/main" xmlns:r="http://schemas.openxmlformats.org/officeDocument/2006/relationships" xmlns:p="http://schemas.openxmlformats.org/presentationml/2006/main">
   <p:cSld>
     <p:spTree>
@@ -4645,7 +5048,7 @@
         </p:nvSpPr>
         <p:spPr>
           <a:xfrm>
-            <a:off x="814275" y="1327350"/>
+            <a:off x="257429" y="997639"/>
             <a:ext cx="3903198" cy="3145500"/>
           </a:xfrm>
         </p:spPr>
@@ -4657,7 +5060,7 @@
               <a:buNone/>
             </a:pPr>
             <a:r>
-              <a:rPr lang="en-US" dirty="0"/>
+              <a:rPr lang="en-US" sz="2000" dirty="0"/>
               <a:t>As we expected, home prices go up in proportion to square footage as well as with proximity to large cities. The average home price in London is £1.864.172, while the average home price in the UK is £328.828</a:t>
             </a:r>
           </a:p>
@@ -4695,7 +5098,7 @@
             </a:pPr>
             <a:fld id="{00000000-1234-1234-1234-123412341234}" type="slidenum">
               <a:rPr lang="en" smtClean="0"/>
-              <a:t>11</a:t>
+              <a:t>12</a:t>
             </a:fld>
             <a:endParaRPr lang="en"/>
           </a:p>
@@ -4723,7 +5126,7 @@
         </p:blipFill>
         <p:spPr>
           <a:xfrm>
-            <a:off x="4874800" y="1953950"/>
+            <a:off x="4383896" y="1448392"/>
             <a:ext cx="2743200" cy="1892300"/>
           </a:xfrm>
           <a:prstGeom prst="rect">
@@ -4744,7 +5147,369 @@
 </p:sld>
 </file>
 
-<file path=ppt/slides/slide12.xml><?xml version="1.0" encoding="utf-8"?>
+<file path=ppt/slides/slide13.xml><?xml version="1.0" encoding="utf-8"?>
+<p:sld xmlns:a="http://schemas.openxmlformats.org/drawingml/2006/main" xmlns:r="http://schemas.openxmlformats.org/officeDocument/2006/relationships" xmlns:p="http://schemas.openxmlformats.org/presentationml/2006/main">
+  <p:cSld>
+    <p:spTree>
+      <p:nvGrpSpPr>
+        <p:cNvPr id="1" name=""/>
+        <p:cNvGrpSpPr/>
+        <p:nvPr/>
+      </p:nvGrpSpPr>
+      <p:grpSpPr>
+        <a:xfrm>
+          <a:off x="0" y="0"/>
+          <a:ext cx="0" cy="0"/>
+          <a:chOff x="0" y="0"/>
+          <a:chExt cx="0" cy="0"/>
+        </a:xfrm>
+      </p:grpSpPr>
+      <p:sp>
+        <p:nvSpPr>
+          <p:cNvPr id="2" name="Title 1">
+            <a:extLst>
+              <a:ext uri="{FF2B5EF4-FFF2-40B4-BE49-F238E27FC236}">
+                <a16:creationId xmlns:a16="http://schemas.microsoft.com/office/drawing/2014/main" id="{D7B3DE4C-01F4-A562-2D38-1FFD8D542404}"/>
+              </a:ext>
+            </a:extLst>
+          </p:cNvPr>
+          <p:cNvSpPr>
+            <a:spLocks noGrp="1"/>
+          </p:cNvSpPr>
+          <p:nvPr>
+            <p:ph type="title"/>
+          </p:nvPr>
+        </p:nvSpPr>
+        <p:spPr/>
+        <p:txBody>
+          <a:bodyPr/>
+          <a:lstStyle/>
+          <a:p>
+            <a:r>
+              <a:rPr lang="en-US" dirty="0"/>
+              <a:t>Findings contd.</a:t>
+            </a:r>
+          </a:p>
+        </p:txBody>
+      </p:sp>
+      <p:sp>
+        <p:nvSpPr>
+          <p:cNvPr id="3" name="Text Placeholder 2">
+            <a:extLst>
+              <a:ext uri="{FF2B5EF4-FFF2-40B4-BE49-F238E27FC236}">
+                <a16:creationId xmlns:a16="http://schemas.microsoft.com/office/drawing/2014/main" id="{9C4213B6-1909-EE55-ECFF-84F86417F81D}"/>
+              </a:ext>
+            </a:extLst>
+          </p:cNvPr>
+          <p:cNvSpPr>
+            <a:spLocks noGrp="1"/>
+          </p:cNvSpPr>
+          <p:nvPr>
+            <p:ph type="body" idx="1"/>
+          </p:nvPr>
+        </p:nvSpPr>
+        <p:spPr>
+          <a:xfrm>
+            <a:off x="154852" y="1415274"/>
+            <a:ext cx="3903198" cy="3145500"/>
+          </a:xfrm>
+        </p:spPr>
+        <p:txBody>
+          <a:bodyPr spcFirstLastPara="1" wrap="square" lIns="91425" tIns="91425" rIns="91425" bIns="91425" anchor="t" anchorCtr="0"/>
+          <a:lstStyle/>
+          <a:p>
+            <a:pPr marL="76200" indent="0">
+              <a:buNone/>
+            </a:pPr>
+            <a:r>
+              <a:rPr lang="en-US" sz="2000" dirty="0"/>
+              <a:t>We found that in some areas the price difference between houses labeled low square feet compared to house in the same area labeled very high square feet could have a up to a 30% discount per/sq ft. Shown in the table Woodford Green had a price difference of 30% as square footage rose.</a:t>
+            </a:r>
+          </a:p>
+        </p:txBody>
+      </p:sp>
+      <p:sp>
+        <p:nvSpPr>
+          <p:cNvPr id="4" name="Slide Number Placeholder 3">
+            <a:extLst>
+              <a:ext uri="{FF2B5EF4-FFF2-40B4-BE49-F238E27FC236}">
+                <a16:creationId xmlns:a16="http://schemas.microsoft.com/office/drawing/2014/main" id="{EF3884D3-DDD7-6F37-3DF4-2F6EFA12C175}"/>
+              </a:ext>
+            </a:extLst>
+          </p:cNvPr>
+          <p:cNvSpPr>
+            <a:spLocks noGrp="1"/>
+          </p:cNvSpPr>
+          <p:nvPr>
+            <p:ph type="sldNum" idx="12"/>
+          </p:nvPr>
+        </p:nvSpPr>
+        <p:spPr/>
+        <p:txBody>
+          <a:bodyPr/>
+          <a:lstStyle/>
+          <a:p>
+            <a:pPr marL="0" lvl="0" indent="0" algn="r" rtl="0">
+              <a:spcBef>
+                <a:spcPts val="0"/>
+              </a:spcBef>
+              <a:spcAft>
+                <a:spcPts val="0"/>
+              </a:spcAft>
+              <a:buNone/>
+            </a:pPr>
+            <a:fld id="{00000000-1234-1234-1234-123412341234}" type="slidenum">
+              <a:rPr lang="en" smtClean="0"/>
+              <a:t>13</a:t>
+            </a:fld>
+            <a:endParaRPr lang="en"/>
+          </a:p>
+        </p:txBody>
+      </p:sp>
+      <p:pic>
+        <p:nvPicPr>
+          <p:cNvPr id="7" name="Picture 7">
+            <a:extLst>
+              <a:ext uri="{FF2B5EF4-FFF2-40B4-BE49-F238E27FC236}">
+                <a16:creationId xmlns:a16="http://schemas.microsoft.com/office/drawing/2014/main" id="{CCD627AC-9D8B-6EB3-38A3-13A014FB36CD}"/>
+              </a:ext>
+            </a:extLst>
+          </p:cNvPr>
+          <p:cNvPicPr>
+            <a:picLocks noChangeAspect="1"/>
+          </p:cNvPicPr>
+          <p:nvPr/>
+        </p:nvPicPr>
+        <p:blipFill>
+          <a:blip r:embed="rId2"/>
+          <a:stretch>
+            <a:fillRect/>
+          </a:stretch>
+        </p:blipFill>
+        <p:spPr>
+          <a:xfrm>
+            <a:off x="4299439" y="1403387"/>
+            <a:ext cx="4487007" cy="1589378"/>
+          </a:xfrm>
+          <a:prstGeom prst="rect">
+            <a:avLst/>
+          </a:prstGeom>
+        </p:spPr>
+      </p:pic>
+    </p:spTree>
+    <p:extLst>
+      <p:ext uri="{BB962C8B-B14F-4D97-AF65-F5344CB8AC3E}">
+        <p14:creationId xmlns:p14="http://schemas.microsoft.com/office/powerpoint/2010/main" val="3837208746"/>
+      </p:ext>
+    </p:extLst>
+  </p:cSld>
+  <p:clrMapOvr>
+    <a:masterClrMapping/>
+  </p:clrMapOvr>
+</p:sld>
+</file>
+
+<file path=ppt/slides/slide14.xml><?xml version="1.0" encoding="utf-8"?>
+<p:sld xmlns:a="http://schemas.openxmlformats.org/drawingml/2006/main" xmlns:r="http://schemas.openxmlformats.org/officeDocument/2006/relationships" xmlns:p="http://schemas.openxmlformats.org/presentationml/2006/main">
+  <p:cSld>
+    <p:spTree>
+      <p:nvGrpSpPr>
+        <p:cNvPr id="1" name=""/>
+        <p:cNvGrpSpPr/>
+        <p:nvPr/>
+      </p:nvGrpSpPr>
+      <p:grpSpPr>
+        <a:xfrm>
+          <a:off x="0" y="0"/>
+          <a:ext cx="0" cy="0"/>
+          <a:chOff x="0" y="0"/>
+          <a:chExt cx="0" cy="0"/>
+        </a:xfrm>
+      </p:grpSpPr>
+      <p:sp>
+        <p:nvSpPr>
+          <p:cNvPr id="2" name="Title 1">
+            <a:extLst>
+              <a:ext uri="{FF2B5EF4-FFF2-40B4-BE49-F238E27FC236}">
+                <a16:creationId xmlns:a16="http://schemas.microsoft.com/office/drawing/2014/main" id="{D7B3DE4C-01F4-A562-2D38-1FFD8D542404}"/>
+              </a:ext>
+            </a:extLst>
+          </p:cNvPr>
+          <p:cNvSpPr>
+            <a:spLocks noGrp="1"/>
+          </p:cNvSpPr>
+          <p:nvPr>
+            <p:ph type="title"/>
+          </p:nvPr>
+        </p:nvSpPr>
+        <p:spPr/>
+        <p:txBody>
+          <a:bodyPr/>
+          <a:lstStyle/>
+          <a:p>
+            <a:r>
+              <a:rPr lang="en-US" dirty="0"/>
+              <a:t>Findings contd.</a:t>
+            </a:r>
+          </a:p>
+        </p:txBody>
+      </p:sp>
+      <p:sp>
+        <p:nvSpPr>
+          <p:cNvPr id="3" name="Text Placeholder 2">
+            <a:extLst>
+              <a:ext uri="{FF2B5EF4-FFF2-40B4-BE49-F238E27FC236}">
+                <a16:creationId xmlns:a16="http://schemas.microsoft.com/office/drawing/2014/main" id="{9C4213B6-1909-EE55-ECFF-84F86417F81D}"/>
+              </a:ext>
+            </a:extLst>
+          </p:cNvPr>
+          <p:cNvSpPr>
+            <a:spLocks noGrp="1"/>
+          </p:cNvSpPr>
+          <p:nvPr>
+            <p:ph type="body" idx="1"/>
+          </p:nvPr>
+        </p:nvSpPr>
+        <p:spPr>
+          <a:xfrm>
+            <a:off x="228121" y="1393293"/>
+            <a:ext cx="5170755" cy="3145500"/>
+          </a:xfrm>
+        </p:spPr>
+        <p:txBody>
+          <a:bodyPr spcFirstLastPara="1" wrap="square" lIns="91425" tIns="91425" rIns="91425" bIns="91425" anchor="t" anchorCtr="0"/>
+          <a:lstStyle/>
+          <a:p>
+            <a:pPr marL="76200" indent="0">
+              <a:buNone/>
+            </a:pPr>
+            <a:r>
+              <a:rPr lang="en-US" sz="2000" dirty="0"/>
+              <a:t>As seen in the heatmap the West Minster area and Regent Park had the highest price/per sq ft. We also found that as you move 1km away from </a:t>
+            </a:r>
+            <a:r>
+              <a:rPr lang="en-US" sz="2000" dirty="0" err="1"/>
+              <a:t>St.John's</a:t>
+            </a:r>
+            <a:r>
+              <a:rPr lang="en-US" sz="2000" dirty="0"/>
+              <a:t> Woods you stood to have a decrease of 84.69 GBP per sq ft. </a:t>
+            </a:r>
+          </a:p>
+        </p:txBody>
+      </p:sp>
+      <p:sp>
+        <p:nvSpPr>
+          <p:cNvPr id="4" name="Slide Number Placeholder 3">
+            <a:extLst>
+              <a:ext uri="{FF2B5EF4-FFF2-40B4-BE49-F238E27FC236}">
+                <a16:creationId xmlns:a16="http://schemas.microsoft.com/office/drawing/2014/main" id="{EF3884D3-DDD7-6F37-3DF4-2F6EFA12C175}"/>
+              </a:ext>
+            </a:extLst>
+          </p:cNvPr>
+          <p:cNvSpPr>
+            <a:spLocks noGrp="1"/>
+          </p:cNvSpPr>
+          <p:nvPr>
+            <p:ph type="sldNum" idx="12"/>
+          </p:nvPr>
+        </p:nvSpPr>
+        <p:spPr/>
+        <p:txBody>
+          <a:bodyPr/>
+          <a:lstStyle/>
+          <a:p>
+            <a:pPr marL="0" lvl="0" indent="0" algn="r" rtl="0">
+              <a:spcBef>
+                <a:spcPts val="0"/>
+              </a:spcBef>
+              <a:spcAft>
+                <a:spcPts val="0"/>
+              </a:spcAft>
+              <a:buNone/>
+            </a:pPr>
+            <a:fld id="{00000000-1234-1234-1234-123412341234}" type="slidenum">
+              <a:rPr lang="en" smtClean="0"/>
+              <a:t>14</a:t>
+            </a:fld>
+            <a:endParaRPr lang="en"/>
+          </a:p>
+        </p:txBody>
+      </p:sp>
+      <p:pic>
+        <p:nvPicPr>
+          <p:cNvPr id="6" name="Picture 7" descr="Map&#10;&#10;Description automatically generated">
+            <a:extLst>
+              <a:ext uri="{FF2B5EF4-FFF2-40B4-BE49-F238E27FC236}">
+                <a16:creationId xmlns:a16="http://schemas.microsoft.com/office/drawing/2014/main" id="{69812E76-28B9-467B-5E16-F4744A0A5766}"/>
+              </a:ext>
+            </a:extLst>
+          </p:cNvPr>
+          <p:cNvPicPr>
+            <a:picLocks noChangeAspect="1"/>
+          </p:cNvPicPr>
+          <p:nvPr/>
+        </p:nvPicPr>
+        <p:blipFill>
+          <a:blip r:embed="rId2"/>
+          <a:stretch>
+            <a:fillRect/>
+          </a:stretch>
+        </p:blipFill>
+        <p:spPr>
+          <a:xfrm>
+            <a:off x="5654919" y="1151028"/>
+            <a:ext cx="2743200" cy="2489752"/>
+          </a:xfrm>
+          <a:prstGeom prst="rect">
+            <a:avLst/>
+          </a:prstGeom>
+        </p:spPr>
+      </p:pic>
+      <p:pic>
+        <p:nvPicPr>
+          <p:cNvPr id="8" name="Picture 8" descr="Chart, scatter chart&#10;&#10;Description automatically generated">
+            <a:extLst>
+              <a:ext uri="{FF2B5EF4-FFF2-40B4-BE49-F238E27FC236}">
+                <a16:creationId xmlns:a16="http://schemas.microsoft.com/office/drawing/2014/main" id="{19D14947-4C52-FA65-AAE6-7296C3FCDC67}"/>
+              </a:ext>
+            </a:extLst>
+          </p:cNvPr>
+          <p:cNvPicPr>
+            <a:picLocks noChangeAspect="1"/>
+          </p:cNvPicPr>
+          <p:nvPr/>
+        </p:nvPicPr>
+        <p:blipFill>
+          <a:blip r:embed="rId3"/>
+          <a:stretch>
+            <a:fillRect/>
+          </a:stretch>
+        </p:blipFill>
+        <p:spPr>
+          <a:xfrm>
+            <a:off x="2475035" y="2826023"/>
+            <a:ext cx="3087565" cy="2099837"/>
+          </a:xfrm>
+          <a:prstGeom prst="rect">
+            <a:avLst/>
+          </a:prstGeom>
+        </p:spPr>
+      </p:pic>
+    </p:spTree>
+    <p:extLst>
+      <p:ext uri="{BB962C8B-B14F-4D97-AF65-F5344CB8AC3E}">
+        <p14:creationId xmlns:p14="http://schemas.microsoft.com/office/powerpoint/2010/main" val="3133829735"/>
+      </p:ext>
+    </p:extLst>
+  </p:cSld>
+  <p:clrMapOvr>
+    <a:masterClrMapping/>
+  </p:clrMapOvr>
+</p:sld>
+</file>
+
+<file path=ppt/slides/slide15.xml><?xml version="1.0" encoding="utf-8"?>
 <p:sld xmlns:a="http://schemas.openxmlformats.org/drawingml/2006/main" xmlns:r="http://schemas.openxmlformats.org/officeDocument/2006/relationships" xmlns:p="http://schemas.openxmlformats.org/presentationml/2006/main">
   <p:cSld>
     <p:spTree>
@@ -4846,7 +5611,7 @@
             </a:pPr>
             <a:fld id="{00000000-1234-1234-1234-123412341234}" type="slidenum">
               <a:rPr lang="en" smtClean="0"/>
-              <a:t>12</a:t>
+              <a:t>15</a:t>
             </a:fld>
             <a:endParaRPr lang="en"/>
           </a:p>
@@ -4925,7 +5690,7 @@
 </p:sld>
 </file>
 
-<file path=ppt/slides/slide13.xml><?xml version="1.0" encoding="utf-8"?>
+<file path=ppt/slides/slide16.xml><?xml version="1.0" encoding="utf-8"?>
 <p:sld xmlns:a="http://schemas.openxmlformats.org/drawingml/2006/main" xmlns:r="http://schemas.openxmlformats.org/officeDocument/2006/relationships" xmlns:p="http://schemas.openxmlformats.org/presentationml/2006/main">
   <p:cSld>
     <p:spTree>
@@ -5033,7 +5798,7 @@
             </a:pPr>
             <a:fld id="{00000000-1234-1234-1234-123412341234}" type="slidenum">
               <a:rPr lang="en" smtClean="0"/>
-              <a:t>13</a:t>
+              <a:t>16</a:t>
             </a:fld>
             <a:endParaRPr lang="en"/>
           </a:p>
@@ -5052,7 +5817,7 @@
 </p:sld>
 </file>
 
-<file path=ppt/slides/slide14.xml><?xml version="1.0" encoding="utf-8"?>
+<file path=ppt/slides/slide17.xml><?xml version="1.0" encoding="utf-8"?>
 <p:sld xmlns:a="http://schemas.openxmlformats.org/drawingml/2006/main" xmlns:r="http://schemas.openxmlformats.org/officeDocument/2006/relationships" xmlns:p="http://schemas.openxmlformats.org/presentationml/2006/main">
   <p:cSld>
     <p:spTree>
@@ -5113,29 +5878,270 @@
             <p:ph type="body" idx="1"/>
           </p:nvPr>
         </p:nvSpPr>
-        <p:spPr/>
+        <p:spPr>
+          <a:xfrm>
+            <a:off x="986" y="1048927"/>
+            <a:ext cx="6132600" cy="3145500"/>
+          </a:xfrm>
+        </p:spPr>
         <p:txBody>
           <a:bodyPr/>
           <a:lstStyle/>
           <a:p>
             <a:r>
-              <a:rPr lang="en-US" sz="1800" u="sng" dirty="0">
-                <a:solidFill>
-                  <a:srgbClr val="0000FF"/>
-                </a:solidFill>
+              <a:rPr lang="en-US" sz="800" dirty="0">
+                <a:latin typeface="Times New Roman"/>
+              </a:rPr>
+              <a:t>Fisher-</a:t>
+            </a:r>
+            <a:r>
+              <a:rPr lang="en-US" sz="800" dirty="0" err="1">
+                <a:latin typeface="Times New Roman"/>
+              </a:rPr>
+              <a:t>Hickney</a:t>
+            </a:r>
+            <a:r>
+              <a:rPr lang="en-US" sz="800" dirty="0">
+                <a:latin typeface="Times New Roman"/>
+              </a:rPr>
+              <a:t>, A. (2017). How to: Folium for maps, heatmaps &amp; time data. Retrieved June 08, 2023 from </a:t>
+            </a:r>
+            <a:r>
+              <a:rPr lang="en-US" sz="800" dirty="0">
+                <a:latin typeface="Times New Roman"/>
+                <a:hlinkClick r:id="rId2">
+                  <a:extLst>
+                    <a:ext uri="{A12FA001-AC4F-418D-AE19-62706E023703}">
+                      <ahyp:hlinkClr xmlns:ahyp="http://schemas.microsoft.com/office/drawing/2018/hyperlinkcolor" val="tx"/>
+                    </a:ext>
+                  </a:extLst>
+                </a:hlinkClick>
+              </a:rPr>
+              <a:t>https://www.kaggle.com/code/daveianhickey/how-to-folium-for</a:t>
+            </a:r>
+            <a:r>
+              <a:rPr lang="en-US" sz="800" dirty="0">
+                <a:latin typeface="Times New Roman"/>
+              </a:rPr>
+              <a:t> maps-heatmaps-time-data/notebook</a:t>
+            </a:r>
+            <a:endParaRPr lang="en-US" sz="800" u="sng">
+              <a:solidFill>
+                <a:srgbClr val="0000FF"/>
+              </a:solidFill>
+              <a:latin typeface="Times New Roman"/>
+            </a:endParaRPr>
+          </a:p>
+          <a:p>
+            <a:r>
+              <a:rPr lang="en-US" sz="800" err="1">
+                <a:latin typeface="Times New Roman"/>
+              </a:rPr>
+              <a:t>GeoPy</a:t>
+            </a:r>
+            <a:r>
+              <a:rPr lang="en-US" sz="800" dirty="0">
+                <a:latin typeface="Times New Roman"/>
+              </a:rPr>
+              <a:t> Contributors. (n.d.). Welcome to </a:t>
+            </a:r>
+            <a:r>
+              <a:rPr lang="en-US" sz="800" err="1">
+                <a:latin typeface="Times New Roman"/>
+              </a:rPr>
+              <a:t>GeoPy’s</a:t>
+            </a:r>
+            <a:r>
+              <a:rPr lang="en-US" sz="800" dirty="0">
+                <a:latin typeface="Times New Roman"/>
+              </a:rPr>
+              <a:t> documentation! Welcome to </a:t>
+            </a:r>
+            <a:r>
+              <a:rPr lang="en-US" sz="800" err="1">
+                <a:latin typeface="Times New Roman"/>
+              </a:rPr>
+              <a:t>GeoPy’s</a:t>
+            </a:r>
+            <a:r>
+              <a:rPr lang="en-US" sz="800" dirty="0">
+                <a:latin typeface="Times New Roman"/>
+              </a:rPr>
+              <a:t> documentation! - </a:t>
+            </a:r>
+            <a:r>
+              <a:rPr lang="en-US" sz="800" err="1">
+                <a:latin typeface="Times New Roman"/>
+              </a:rPr>
+              <a:t>GeoPy</a:t>
+            </a:r>
+            <a:r>
+              <a:rPr lang="en-US" sz="800" dirty="0">
+                <a:latin typeface="Times New Roman"/>
+              </a:rPr>
+              <a:t> 2.3.0 documentation. </a:t>
+            </a:r>
+            <a:r>
+              <a:rPr lang="en-US" sz="800" dirty="0">
+                <a:latin typeface="Times New Roman"/>
+                <a:hlinkClick r:id="rId3">
+                  <a:extLst>
+                    <a:ext uri="{A12FA001-AC4F-418D-AE19-62706E023703}">
+                      <ahyp:hlinkClr xmlns:ahyp="http://schemas.microsoft.com/office/drawing/2018/hyperlinkcolor" val="tx"/>
+                    </a:ext>
+                  </a:extLst>
+                </a:hlinkClick>
+              </a:rPr>
+              <a:t>https://geopy.readthedocs.io/en/stable/</a:t>
+            </a:r>
+            <a:endParaRPr lang="en-US" sz="800" dirty="0">
+              <a:latin typeface="Times New Roman"/>
+            </a:endParaRPr>
+          </a:p>
+          <a:p>
+            <a:r>
+              <a:rPr lang="en-US" sz="800" dirty="0">
+                <a:latin typeface="Times New Roman"/>
+              </a:rPr>
+              <a:t>HM LAND REGISTRY. (2020). UK Housing Prices Paid. Retrieved June 08, 2023 from </a:t>
+            </a:r>
+            <a:r>
+              <a:rPr lang="en-US" sz="800" dirty="0">
                 <a:effectLst/>
-                <a:latin typeface="Verdana" panose="020B0604030504040204" pitchFamily="34" charset="0"/>
-                <a:ea typeface="Times New Roman" panose="02020603050405020304" pitchFamily="18" charset="0"/>
-                <a:hlinkClick r:id="rId2"/>
+                <a:latin typeface="Times New Roman"/>
+                <a:hlinkClick r:id="rId4">
+                  <a:extLst>
+                    <a:ext uri="{A12FA001-AC4F-418D-AE19-62706E023703}">
+                      <ahyp:hlinkClr xmlns:ahyp="http://schemas.microsoft.com/office/drawing/2018/hyperlinkcolor" val="tx"/>
+                    </a:ext>
+                  </a:extLst>
+                </a:hlinkClick>
               </a:rPr>
               <a:t>https://www.kaggle.com/datasets/hm-land-registry/uk-housing-prices-paid</a:t>
             </a:r>
-            <a:endParaRPr lang="en-US" sz="1800" u="sng" dirty="0">
+            <a:endParaRPr lang="en-US" sz="800" dirty="0">
+              <a:latin typeface="Times New Roman"/>
+            </a:endParaRPr>
+          </a:p>
+          <a:p>
+            <a:r>
+              <a:rPr lang="en-US" sz="800" dirty="0">
+                <a:latin typeface="Times New Roman"/>
+              </a:rPr>
+              <a:t>Hunter, J., Dale, D., Firing, E., </a:t>
+            </a:r>
+            <a:r>
+              <a:rPr lang="en-US" sz="800" err="1">
+                <a:latin typeface="Times New Roman"/>
+              </a:rPr>
+              <a:t>Droettboom</a:t>
+            </a:r>
+            <a:r>
+              <a:rPr lang="en-US" sz="800" dirty="0">
+                <a:latin typeface="Times New Roman"/>
+              </a:rPr>
+              <a:t>, M., &amp; Matplotlib development team. (n.d.). Matplotlib 3.7.1 documentation#. Matplotlib documentation - Matplotlib 3.7.1 documentation. </a:t>
+            </a:r>
+            <a:r>
+              <a:rPr lang="en-US" sz="800" dirty="0">
+                <a:latin typeface="Times New Roman"/>
+                <a:hlinkClick r:id="rId5"/>
+              </a:rPr>
+              <a:t>https://matplotlib.org/stable/</a:t>
+            </a:r>
+            <a:endParaRPr lang="en-US" sz="800" dirty="0">
+              <a:latin typeface="Times New Roman"/>
+            </a:endParaRPr>
+          </a:p>
+          <a:p>
+            <a:r>
+              <a:rPr lang="en-US" sz="800" dirty="0">
+                <a:latin typeface="Times New Roman"/>
+              </a:rPr>
+              <a:t>Kulkarni, A. (2020). Housing Prices in London. Retrieved June 08, 2023 from </a:t>
+            </a:r>
+            <a:r>
+              <a:rPr lang="en-US" sz="800" dirty="0">
+                <a:effectLst/>
+                <a:latin typeface="Times New Roman"/>
+                <a:hlinkClick r:id="rId6"/>
+              </a:rPr>
+              <a:t>https://www.kaggle.com/datasets/arnavkulkarni/housing-prices-in-london</a:t>
+            </a:r>
+            <a:r>
+              <a:rPr lang="en-US" sz="800" dirty="0">
+                <a:latin typeface="Times New Roman"/>
+              </a:rPr>
+              <a:t>.</a:t>
+            </a:r>
+          </a:p>
+          <a:p>
+            <a:r>
+              <a:rPr lang="en-US" sz="800" dirty="0">
+                <a:latin typeface="Times New Roman"/>
+              </a:rPr>
+              <a:t>Pandas. (n.d.). User guide#. User Guide - pandas 2.0.2 documentation. </a:t>
+            </a:r>
+            <a:r>
+              <a:rPr lang="en-US" sz="800" dirty="0">
+                <a:latin typeface="Times New Roman"/>
+                <a:hlinkClick r:id="rId7"/>
+              </a:rPr>
+              <a:t>https://pandas.pydata.org/docs/user_guide/index.html</a:t>
+            </a:r>
+            <a:endParaRPr lang="en-US" sz="800" dirty="0">
+              <a:latin typeface="Times New Roman"/>
+            </a:endParaRPr>
+          </a:p>
+          <a:p>
+            <a:r>
+              <a:rPr lang="en-US" sz="800" dirty="0">
+                <a:latin typeface="Times New Roman"/>
+              </a:rPr>
+              <a:t>Martin </a:t>
+            </a:r>
+            <a:r>
+              <a:rPr lang="en-US" sz="800" dirty="0" err="1">
+                <a:latin typeface="Times New Roman"/>
+              </a:rPr>
+              <a:t>Thoma</a:t>
+            </a:r>
+            <a:r>
+              <a:rPr lang="en-US" sz="800" dirty="0">
+                <a:latin typeface="Times New Roman"/>
+              </a:rPr>
+              <a:t>, </a:t>
+            </a:r>
+            <a:r>
+              <a:rPr lang="en-US" sz="800" dirty="0" err="1">
+                <a:latin typeface="Times New Roman"/>
+              </a:rPr>
+              <a:t>mpu</a:t>
+            </a:r>
+            <a:r>
+              <a:rPr lang="en-US" sz="800" dirty="0">
+                <a:latin typeface="Times New Roman"/>
+              </a:rPr>
+              <a:t>, (2022), GitHub repository, Retrieved June 08, 2023 from </a:t>
+            </a:r>
+            <a:r>
+              <a:rPr lang="en-US" sz="800" dirty="0">
+                <a:latin typeface="Times New Roman"/>
+                <a:hlinkClick r:id="rId8"/>
+              </a:rPr>
+              <a:t>https://github.com/MartinThoma/mpu</a:t>
+            </a:r>
+            <a:endParaRPr lang="en-US" sz="800" dirty="0">
+              <a:latin typeface="Times New Roman"/>
+            </a:endParaRPr>
+          </a:p>
+          <a:p>
+            <a:endParaRPr lang="en-US" sz="800" u="sng" dirty="0">
               <a:solidFill>
                 <a:srgbClr val="0000FF"/>
               </a:solidFill>
               <a:effectLst/>
-              <a:latin typeface="Verdana" panose="020B0604030504040204" pitchFamily="34" charset="0"/>
+              <a:latin typeface="Times New Roman"/>
               <a:ea typeface="Times New Roman" panose="02020603050405020304" pitchFamily="18" charset="0"/>
             </a:endParaRPr>
           </a:p>
@@ -5143,44 +6149,9 @@
             <a:pPr marL="76200" indent="0">
               <a:buNone/>
             </a:pPr>
-            <a:endParaRPr lang="en-US" sz="1800" u="sng" dirty="0">
-              <a:solidFill>
-                <a:srgbClr val="0000FF"/>
-              </a:solidFill>
-              <a:latin typeface="Verdana" panose="020B0604030504040204" pitchFamily="34" charset="0"/>
-              <a:ea typeface="Times New Roman" panose="02020603050405020304" pitchFamily="18" charset="0"/>
+            <a:endParaRPr lang="en-US" sz="800" dirty="0">
+              <a:latin typeface="Times New Roman"/>
             </a:endParaRPr>
-          </a:p>
-          <a:p>
-            <a:pPr marL="76200" indent="0">
-              <a:buNone/>
-            </a:pPr>
-            <a:endParaRPr lang="en-US" sz="1800" dirty="0">
-              <a:effectLst/>
-              <a:latin typeface="Times New Roman" panose="02020603050405020304" pitchFamily="18" charset="0"/>
-              <a:ea typeface="Times New Roman" panose="02020603050405020304" pitchFamily="18" charset="0"/>
-            </a:endParaRPr>
-          </a:p>
-          <a:p>
-            <a:r>
-              <a:rPr lang="en-US" sz="1800" dirty="0">
-                <a:effectLst/>
-                <a:latin typeface="Verdana" panose="020B0604030504040204" pitchFamily="34" charset="0"/>
-                <a:ea typeface="Times New Roman" panose="02020603050405020304" pitchFamily="18" charset="0"/>
-              </a:rPr>
-              <a:t>https://www.kaggle.com/datasets/arnavkulkarni/housing-prices-in-london</a:t>
-            </a:r>
-            <a:endParaRPr lang="en-US" sz="1800" dirty="0">
-              <a:effectLst/>
-              <a:latin typeface="Times New Roman" panose="02020603050405020304" pitchFamily="18" charset="0"/>
-              <a:ea typeface="Times New Roman" panose="02020603050405020304" pitchFamily="18" charset="0"/>
-            </a:endParaRPr>
-          </a:p>
-          <a:p>
-            <a:pPr marL="76200" indent="0">
-              <a:buNone/>
-            </a:pPr>
-            <a:endParaRPr lang="en-US" dirty="0"/>
           </a:p>
         </p:txBody>
       </p:sp>
@@ -5216,7 +6187,7 @@
             </a:pPr>
             <a:fld id="{00000000-1234-1234-1234-123412341234}" type="slidenum">
               <a:rPr lang="en" smtClean="0"/>
-              <a:t>14</a:t>
+              <a:t>17</a:t>
             </a:fld>
             <a:endParaRPr lang="en"/>
           </a:p>
@@ -5235,7 +6206,7 @@
 </p:sld>
 </file>
 
-<file path=ppt/slides/slide15.xml><?xml version="1.0" encoding="utf-8"?>
+<file path=ppt/slides/slide18.xml><?xml version="1.0" encoding="utf-8"?>
 <p:sld xmlns:a="http://schemas.openxmlformats.org/drawingml/2006/main" xmlns:r="http://schemas.openxmlformats.org/officeDocument/2006/relationships" xmlns:p="http://schemas.openxmlformats.org/presentationml/2006/main">
   <p:cSld>
     <p:spTree>
@@ -5300,7 +6271,7 @@
             </a:pPr>
             <a:fld id="{00000000-1234-1234-1234-123412341234}" type="slidenum">
               <a:rPr lang="en" smtClean="0"/>
-              <a:t>15</a:t>
+              <a:t>18</a:t>
             </a:fld>
             <a:endParaRPr lang="en"/>
           </a:p>
@@ -5427,39 +6398,32 @@
           <a:lstStyle/>
           <a:p>
             <a:r>
-              <a:rPr lang="en-US"/>
-              <a:t>(Example)</a:t>
-            </a:r>
-            <a:br>
-              <a:rPr lang="en-US"/>
-            </a:br>
-            <a:r>
-              <a:rPr lang="en-US"/>
+              <a:rPr lang="en-US" dirty="0"/>
               <a:t>Problem Statement</a:t>
             </a:r>
           </a:p>
           <a:p>
             <a:r>
-              <a:rPr lang="en-US"/>
-              <a:t>Motivation</a:t>
-            </a:r>
-          </a:p>
-          <a:p>
-            <a:r>
-              <a:rPr lang="en-US"/>
-              <a:t>Background</a:t>
-            </a:r>
-          </a:p>
-          <a:p>
-            <a:r>
-              <a:rPr lang="en-US"/>
+              <a:rPr lang="en-US" dirty="0"/>
+              <a:t>Approach</a:t>
+            </a:r>
+          </a:p>
+          <a:p>
+            <a:r>
+              <a:rPr lang="en-US" dirty="0"/>
+              <a:t>Technologies</a:t>
+            </a:r>
+          </a:p>
+          <a:p>
+            <a:r>
+              <a:rPr lang="en-US" dirty="0"/>
               <a:t>Related Work</a:t>
             </a:r>
           </a:p>
           <a:p>
             <a:r>
-              <a:rPr lang="en-US"/>
-              <a:t>Approach</a:t>
+              <a:rPr lang="en-US" dirty="0"/>
+              <a:t>Data Cleaning</a:t>
             </a:r>
           </a:p>
         </p:txBody>
@@ -5506,8 +6470,8 @@
         </p:nvSpPr>
         <p:spPr>
           <a:xfrm>
-            <a:off x="4651022" y="1327350"/>
-            <a:ext cx="3836747" cy="3145500"/>
+            <a:off x="4706329" y="1493269"/>
+            <a:ext cx="3836747" cy="2159202"/>
           </a:xfrm>
           <a:prstGeom prst="rect">
             <a:avLst/>
@@ -5767,32 +6731,38 @@
             </a:lvl9pPr>
           </a:lstStyle>
           <a:p>
-            <a:r>
-              <a:rPr lang="en-US"/>
-              <a:t>…</a:t>
-            </a:r>
-          </a:p>
-          <a:p>
-            <a:r>
-              <a:rPr lang="en-US"/>
+            <a:pPr marL="76200" indent="0">
+              <a:buNone/>
+            </a:pPr>
+            <a:endParaRPr lang="en-US" dirty="0"/>
+          </a:p>
+          <a:p>
+            <a:r>
+              <a:rPr lang="en-US" dirty="0"/>
+              <a:t>Findings</a:t>
+            </a:r>
+          </a:p>
+          <a:p>
+            <a:r>
+              <a:rPr lang="en-US" dirty="0"/>
               <a:t>Conclusion</a:t>
             </a:r>
           </a:p>
           <a:p>
             <a:r>
-              <a:rPr lang="en-US"/>
+              <a:rPr lang="en-US" dirty="0"/>
               <a:t>Future Work</a:t>
             </a:r>
           </a:p>
           <a:p>
             <a:r>
-              <a:rPr lang="en-US"/>
-              <a:t>Key Reference</a:t>
-            </a:r>
-          </a:p>
-          <a:p>
-            <a:r>
-              <a:rPr lang="en-US"/>
+              <a:rPr lang="en-US" dirty="0"/>
+              <a:t>Reference</a:t>
+            </a:r>
+          </a:p>
+          <a:p>
+            <a:r>
+              <a:rPr lang="en-US" dirty="0"/>
               <a:t>Q&amp;A</a:t>
             </a:r>
           </a:p>
@@ -5870,7 +6840,7 @@
             </a:pPr>
             <a:r>
               <a:rPr lang="en-US" dirty="0"/>
-              <a:t>We would like to explore housing prices in London and other major cities, as well as the UK as a whole and see how they compare.</a:t>
+              <a:t>Utilizing the free available UK housing datasets, we would like to explore and analyze housing prices in London and other areas. Ideally utilizing the technique and methods taught throughout the course</a:t>
             </a:r>
           </a:p>
         </p:txBody>
@@ -5991,15 +6961,7 @@
             </a:pPr>
             <a:r>
               <a:rPr lang="en-US" dirty="0"/>
-              <a:t>With techniques we learned in this class we cleaned our datasets, then created </a:t>
-            </a:r>
-            <a:r>
-              <a:rPr lang="en-US" dirty="0" err="1"/>
-              <a:t>dataframes</a:t>
-            </a:r>
-            <a:r>
-              <a:rPr lang="en-US" dirty="0"/>
-              <a:t>, plots and heatmaps to show trends and findings in our data.</a:t>
+              <a:t>With the techniques we learned in  class we performed the following : cleaned our datasets, created data frames, analyzed our data, and finally created plots and heatmaps to visualize our findings</a:t>
             </a:r>
           </a:p>
         </p:txBody>
@@ -6134,10 +7096,28 @@
           </a:p>
           <a:p>
             <a:r>
+              <a:rPr lang="en-US" err="1"/>
+              <a:t>Matplotlib.pyplot</a:t>
+            </a:r>
+            <a:endParaRPr lang="en-US"/>
+          </a:p>
+          <a:p>
+            <a:r>
               <a:rPr lang="en-US" dirty="0" err="1"/>
-              <a:t>Matplotlib.pyplot</a:t>
-            </a:r>
-            <a:endParaRPr lang="en-US" dirty="0"/>
+              <a:t>Geopy</a:t>
+            </a:r>
+            <a:r>
+              <a:rPr lang="en-US" dirty="0"/>
+              <a:t>, </a:t>
+            </a:r>
+            <a:r>
+              <a:rPr lang="en-US" dirty="0" err="1"/>
+              <a:t>Mpu</a:t>
+            </a:r>
+            <a:r>
+              <a:rPr lang="en-US" dirty="0"/>
+              <a:t>, Folium</a:t>
+            </a:r>
           </a:p>
         </p:txBody>
       </p:sp>
@@ -6637,7 +7617,7 @@
           <p:cNvPr id="2" name="Title 1">
             <a:extLst>
               <a:ext uri="{FF2B5EF4-FFF2-40B4-BE49-F238E27FC236}">
-                <a16:creationId xmlns:a16="http://schemas.microsoft.com/office/drawing/2014/main" id="{F625A524-BD98-C5F0-7C52-E0E657448133}"/>
+                <a16:creationId xmlns:a16="http://schemas.microsoft.com/office/drawing/2014/main" id="{B5F8679E-1222-6879-05B1-C46135C583DC}"/>
               </a:ext>
             </a:extLst>
           </p:cNvPr>
@@ -6654,8 +7634,16 @@
           <a:lstStyle/>
           <a:p>
             <a:r>
+              <a:rPr lang="en-US" dirty="0" err="1"/>
+              <a:t>Geopy</a:t>
+            </a:r>
+            <a:r>
               <a:rPr lang="en-US" dirty="0"/>
-              <a:t>Data Cleaning</a:t>
+              <a:t>, </a:t>
+            </a:r>
+            <a:r>
+              <a:rPr lang="en-US"/>
+              <a:t>Mpu, and Folium</a:t>
             </a:r>
           </a:p>
         </p:txBody>
@@ -6665,7 +7653,7 @@
           <p:cNvPr id="3" name="Text Placeholder 2">
             <a:extLst>
               <a:ext uri="{FF2B5EF4-FFF2-40B4-BE49-F238E27FC236}">
-                <a16:creationId xmlns:a16="http://schemas.microsoft.com/office/drawing/2014/main" id="{4C753171-CC61-AF7D-5CB0-878CA0276177}"/>
+                <a16:creationId xmlns:a16="http://schemas.microsoft.com/office/drawing/2014/main" id="{79127BB7-E5EE-0ABE-1833-E762C8C34E82}"/>
               </a:ext>
             </a:extLst>
           </p:cNvPr>
@@ -6676,26 +7664,71 @@
             <p:ph type="body" idx="1"/>
           </p:nvPr>
         </p:nvSpPr>
-        <p:spPr/>
+        <p:spPr>
+          <a:xfrm>
+            <a:off x="22967" y="1313404"/>
+            <a:ext cx="8543157" cy="3108157"/>
+          </a:xfrm>
+        </p:spPr>
         <p:txBody>
-          <a:bodyPr/>
+          <a:bodyPr spcFirstLastPara="1" wrap="square" lIns="91425" tIns="91425" rIns="91425" bIns="91425" anchor="t" anchorCtr="0"/>
           <a:lstStyle/>
           <a:p>
             <a:pPr marL="76200" indent="0">
               <a:buNone/>
             </a:pPr>
             <a:r>
-              <a:rPr lang="en-US" dirty="0"/>
-              <a:t>We had to do some data cleaning to come up with data that was more directly comparable and to remove values that would skew our visualizations, such as </a:t>
-            </a:r>
-            <a:r>
-              <a:rPr lang="en-US" dirty="0" err="1"/>
-              <a:t>NaN</a:t>
-            </a:r>
-            <a:r>
-              <a:rPr lang="en-US" dirty="0"/>
-              <a:t> and duplicate values. </a:t>
-            </a:r>
+              <a:rPr lang="en-US" sz="2000" dirty="0"/>
+              <a:t>The </a:t>
+            </a:r>
+            <a:r>
+              <a:rPr lang="en-US" sz="2000" err="1"/>
+              <a:t>Geopy</a:t>
+            </a:r>
+            <a:r>
+              <a:rPr lang="en-US" sz="2000" dirty="0"/>
+              <a:t> library was utilized to apply latitude and longitude to UK London counties.</a:t>
+            </a:r>
+          </a:p>
+          <a:p>
+            <a:pPr marL="76200" indent="0">
+              <a:buNone/>
+            </a:pPr>
+            <a:endParaRPr lang="en-US" sz="2000" dirty="0"/>
+          </a:p>
+          <a:p>
+            <a:pPr marL="76200" indent="0">
+              <a:buNone/>
+            </a:pPr>
+            <a:r>
+              <a:rPr lang="en-US" sz="2000" err="1"/>
+              <a:t>Mpu</a:t>
+            </a:r>
+            <a:r>
+              <a:rPr lang="en-US" sz="2000" dirty="0"/>
+              <a:t> library provides mathematical functions, for this project it allowed us to calculate the distance between 2 locations with their latitude and longitude.</a:t>
+            </a:r>
+          </a:p>
+          <a:p>
+            <a:pPr marL="76200" indent="0">
+              <a:buNone/>
+            </a:pPr>
+            <a:endParaRPr lang="en-US" sz="2000" dirty="0"/>
+          </a:p>
+          <a:p>
+            <a:pPr marL="76200" indent="0">
+              <a:buNone/>
+            </a:pPr>
+            <a:r>
+              <a:rPr lang="en-US" sz="2000" dirty="0"/>
+              <a:t>Folium library allowed us to create leaflet maps as well as allow us to build heatmaps!</a:t>
+            </a:r>
+          </a:p>
+          <a:p>
+            <a:pPr marL="76200" indent="0">
+              <a:buNone/>
+            </a:pPr>
+            <a:endParaRPr lang="en-US" sz="2000" dirty="0"/>
           </a:p>
         </p:txBody>
       </p:sp>
@@ -6704,7 +7737,7 @@
           <p:cNvPr id="4" name="Slide Number Placeholder 3">
             <a:extLst>
               <a:ext uri="{FF2B5EF4-FFF2-40B4-BE49-F238E27FC236}">
-                <a16:creationId xmlns:a16="http://schemas.microsoft.com/office/drawing/2014/main" id="{58147226-5C11-DA09-8F9C-C066F1B12049}"/>
+                <a16:creationId xmlns:a16="http://schemas.microsoft.com/office/drawing/2014/main" id="{E15EC010-A495-3602-8EF2-982961054565}"/>
               </a:ext>
             </a:extLst>
           </p:cNvPr>
@@ -6740,7 +7773,7 @@
     </p:spTree>
     <p:extLst>
       <p:ext uri="{BB962C8B-B14F-4D97-AF65-F5344CB8AC3E}">
-        <p14:creationId xmlns:p14="http://schemas.microsoft.com/office/powerpoint/2010/main" val="342675417"/>
+        <p14:creationId xmlns:p14="http://schemas.microsoft.com/office/powerpoint/2010/main" val="3407748887"/>
       </p:ext>
     </p:extLst>
   </p:cSld>

</xml_diff>